<commit_message>
je les ai eteint , eteint comme dirait le nueve
</commit_message>
<xml_diff>
--- a/SHOPCART.pptx
+++ b/SHOPCART.pptx
@@ -14,6 +14,18 @@
     <p:sldId id="262" r:id="rId8"/>
     <p:sldId id="263" r:id="rId9"/>
     <p:sldId id="264" r:id="rId10"/>
+    <p:sldId id="265" r:id="rId11"/>
+    <p:sldId id="266" r:id="rId12"/>
+    <p:sldId id="267" r:id="rId13"/>
+    <p:sldId id="268" r:id="rId14"/>
+    <p:sldId id="269" r:id="rId15"/>
+    <p:sldId id="270" r:id="rId16"/>
+    <p:sldId id="271" r:id="rId17"/>
+    <p:sldId id="272" r:id="rId18"/>
+    <p:sldId id="273" r:id="rId19"/>
+    <p:sldId id="274" r:id="rId20"/>
+    <p:sldId id="275" r:id="rId21"/>
+    <p:sldId id="276" r:id="rId22"/>
   </p:sldIdLst>
   <p:sldSz cx="12192000" cy="6858000"/>
   <p:notesSz cx="6858000" cy="9144000"/>
@@ -112,6 +124,11 @@
       </a:defRPr>
     </a:lvl9pPr>
   </p:defaultTextStyle>
+  <p:extLst>
+    <p:ext uri="{EFAFB233-063F-42B5-8137-9DF3F51BA10A}">
+      <p15:sldGuideLst xmlns:p15="http://schemas.microsoft.com/office/powerpoint/2012/main"/>
+    </p:ext>
+  </p:extLst>
 </p:presentation>
 </file>
 
@@ -262,7 +279,7 @@
           <a:p>
             <a:fld id="{55B73BFA-447D-4AA4-BDF1-FD8FEF706F2B}" type="datetimeFigureOut">
               <a:rPr lang="fr-FR" smtClean="0"/>
-              <a:t>16/07/2025</a:t>
+              <a:t>17/07/2025</a:t>
             </a:fld>
             <a:endParaRPr lang="fr-FR"/>
           </a:p>
@@ -460,7 +477,7 @@
           <a:p>
             <a:fld id="{55B73BFA-447D-4AA4-BDF1-FD8FEF706F2B}" type="datetimeFigureOut">
               <a:rPr lang="fr-FR" smtClean="0"/>
-              <a:t>16/07/2025</a:t>
+              <a:t>17/07/2025</a:t>
             </a:fld>
             <a:endParaRPr lang="fr-FR"/>
           </a:p>
@@ -668,7 +685,7 @@
           <a:p>
             <a:fld id="{55B73BFA-447D-4AA4-BDF1-FD8FEF706F2B}" type="datetimeFigureOut">
               <a:rPr lang="fr-FR" smtClean="0"/>
-              <a:t>16/07/2025</a:t>
+              <a:t>17/07/2025</a:t>
             </a:fld>
             <a:endParaRPr lang="fr-FR"/>
           </a:p>
@@ -866,7 +883,7 @@
           <a:p>
             <a:fld id="{55B73BFA-447D-4AA4-BDF1-FD8FEF706F2B}" type="datetimeFigureOut">
               <a:rPr lang="fr-FR" smtClean="0"/>
-              <a:t>16/07/2025</a:t>
+              <a:t>17/07/2025</a:t>
             </a:fld>
             <a:endParaRPr lang="fr-FR"/>
           </a:p>
@@ -1141,7 +1158,7 @@
           <a:p>
             <a:fld id="{55B73BFA-447D-4AA4-BDF1-FD8FEF706F2B}" type="datetimeFigureOut">
               <a:rPr lang="fr-FR" smtClean="0"/>
-              <a:t>16/07/2025</a:t>
+              <a:t>17/07/2025</a:t>
             </a:fld>
             <a:endParaRPr lang="fr-FR"/>
           </a:p>
@@ -1406,7 +1423,7 @@
           <a:p>
             <a:fld id="{55B73BFA-447D-4AA4-BDF1-FD8FEF706F2B}" type="datetimeFigureOut">
               <a:rPr lang="fr-FR" smtClean="0"/>
-              <a:t>16/07/2025</a:t>
+              <a:t>17/07/2025</a:t>
             </a:fld>
             <a:endParaRPr lang="fr-FR"/>
           </a:p>
@@ -1818,7 +1835,7 @@
           <a:p>
             <a:fld id="{55B73BFA-447D-4AA4-BDF1-FD8FEF706F2B}" type="datetimeFigureOut">
               <a:rPr lang="fr-FR" smtClean="0"/>
-              <a:t>16/07/2025</a:t>
+              <a:t>17/07/2025</a:t>
             </a:fld>
             <a:endParaRPr lang="fr-FR"/>
           </a:p>
@@ -1959,7 +1976,7 @@
           <a:p>
             <a:fld id="{55B73BFA-447D-4AA4-BDF1-FD8FEF706F2B}" type="datetimeFigureOut">
               <a:rPr lang="fr-FR" smtClean="0"/>
-              <a:t>16/07/2025</a:t>
+              <a:t>17/07/2025</a:t>
             </a:fld>
             <a:endParaRPr lang="fr-FR"/>
           </a:p>
@@ -2072,7 +2089,7 @@
           <a:p>
             <a:fld id="{55B73BFA-447D-4AA4-BDF1-FD8FEF706F2B}" type="datetimeFigureOut">
               <a:rPr lang="fr-FR" smtClean="0"/>
-              <a:t>16/07/2025</a:t>
+              <a:t>17/07/2025</a:t>
             </a:fld>
             <a:endParaRPr lang="fr-FR"/>
           </a:p>
@@ -2383,7 +2400,7 @@
           <a:p>
             <a:fld id="{55B73BFA-447D-4AA4-BDF1-FD8FEF706F2B}" type="datetimeFigureOut">
               <a:rPr lang="fr-FR" smtClean="0"/>
-              <a:t>16/07/2025</a:t>
+              <a:t>17/07/2025</a:t>
             </a:fld>
             <a:endParaRPr lang="fr-FR"/>
           </a:p>
@@ -2671,7 +2688,7 @@
           <a:p>
             <a:fld id="{55B73BFA-447D-4AA4-BDF1-FD8FEF706F2B}" type="datetimeFigureOut">
               <a:rPr lang="fr-FR" smtClean="0"/>
-              <a:t>16/07/2025</a:t>
+              <a:t>17/07/2025</a:t>
             </a:fld>
             <a:endParaRPr lang="fr-FR"/>
           </a:p>
@@ -2912,7 +2929,7 @@
           <a:p>
             <a:fld id="{55B73BFA-447D-4AA4-BDF1-FD8FEF706F2B}" type="datetimeFigureOut">
               <a:rPr lang="fr-FR" smtClean="0"/>
-              <a:t>16/07/2025</a:t>
+              <a:t>17/07/2025</a:t>
             </a:fld>
             <a:endParaRPr lang="fr-FR"/>
           </a:p>
@@ -3391,6 +3408,1788 @@
 </p:sld>
 </file>
 
+<file path=ppt/slides/slide10.xml><?xml version="1.0" encoding="utf-8"?>
+<p:sld xmlns:a="http://schemas.openxmlformats.org/drawingml/2006/main" xmlns:r="http://schemas.openxmlformats.org/officeDocument/2006/relationships" xmlns:p="http://schemas.openxmlformats.org/presentationml/2006/main">
+  <p:cSld>
+    <p:spTree>
+      <p:nvGrpSpPr>
+        <p:cNvPr id="1" name=""/>
+        <p:cNvGrpSpPr/>
+        <p:nvPr/>
+      </p:nvGrpSpPr>
+      <p:grpSpPr>
+        <a:xfrm>
+          <a:off x="0" y="0"/>
+          <a:ext cx="0" cy="0"/>
+          <a:chOff x="0" y="0"/>
+          <a:chExt cx="0" cy="0"/>
+        </a:xfrm>
+      </p:grpSpPr>
+      <p:pic>
+        <p:nvPicPr>
+          <p:cNvPr id="5" name="Image 4">
+            <a:extLst>
+              <a:ext uri="{FF2B5EF4-FFF2-40B4-BE49-F238E27FC236}">
+                <a16:creationId xmlns:a16="http://schemas.microsoft.com/office/drawing/2014/main" id="{37E83A8A-DD9C-39E5-5D87-1F0DC1F002AD}"/>
+              </a:ext>
+            </a:extLst>
+          </p:cNvPr>
+          <p:cNvPicPr>
+            <a:picLocks noChangeAspect="1"/>
+          </p:cNvPicPr>
+          <p:nvPr/>
+        </p:nvPicPr>
+        <p:blipFill>
+          <a:blip r:embed="rId2">
+            <a:extLst>
+              <a:ext uri="{28A0092B-C50C-407E-A947-70E740481C1C}">
+                <a14:useLocalDpi xmlns:a14="http://schemas.microsoft.com/office/drawing/2010/main" val="0"/>
+              </a:ext>
+            </a:extLst>
+          </a:blip>
+          <a:stretch>
+            <a:fillRect/>
+          </a:stretch>
+        </p:blipFill>
+        <p:spPr>
+          <a:xfrm>
+            <a:off x="394796" y="508000"/>
+            <a:ext cx="7928787" cy="5608320"/>
+          </a:xfrm>
+          <a:prstGeom prst="rect">
+            <a:avLst/>
+          </a:prstGeom>
+        </p:spPr>
+      </p:pic>
+      <p:sp>
+        <p:nvSpPr>
+          <p:cNvPr id="6" name="ZoneTexte 5">
+            <a:extLst>
+              <a:ext uri="{FF2B5EF4-FFF2-40B4-BE49-F238E27FC236}">
+                <a16:creationId xmlns:a16="http://schemas.microsoft.com/office/drawing/2014/main" id="{49026173-B64F-536E-4FD0-278B78F69028}"/>
+              </a:ext>
+            </a:extLst>
+          </p:cNvPr>
+          <p:cNvSpPr txBox="1"/>
+          <p:nvPr/>
+        </p:nvSpPr>
+        <p:spPr>
+          <a:xfrm>
+            <a:off x="8778240" y="1412240"/>
+            <a:ext cx="3018964" cy="646331"/>
+          </a:xfrm>
+          <a:prstGeom prst="rect">
+            <a:avLst/>
+          </a:prstGeom>
+          <a:noFill/>
+        </p:spPr>
+        <p:txBody>
+          <a:bodyPr wrap="square" rtlCol="0">
+            <a:spAutoFit/>
+          </a:bodyPr>
+          <a:lstStyle/>
+          <a:p>
+            <a:r>
+              <a:rPr lang="fr-FR" dirty="0"/>
+              <a:t>Extrait script </a:t>
+            </a:r>
+            <a:r>
+              <a:rPr lang="fr-FR" dirty="0" err="1"/>
+              <a:t>sql</a:t>
+            </a:r>
+            <a:r>
+              <a:rPr lang="fr-FR" dirty="0"/>
+              <a:t> pour la </a:t>
+            </a:r>
+            <a:r>
+              <a:rPr lang="fr-FR" dirty="0" err="1"/>
+              <a:t>creation</a:t>
+            </a:r>
+            <a:r>
+              <a:rPr lang="fr-FR" dirty="0"/>
+              <a:t> de la BDD</a:t>
+            </a:r>
+          </a:p>
+        </p:txBody>
+      </p:sp>
+    </p:spTree>
+    <p:extLst>
+      <p:ext uri="{BB962C8B-B14F-4D97-AF65-F5344CB8AC3E}">
+        <p14:creationId xmlns:p14="http://schemas.microsoft.com/office/powerpoint/2010/main" val="1438797230"/>
+      </p:ext>
+    </p:extLst>
+  </p:cSld>
+  <p:clrMapOvr>
+    <a:masterClrMapping/>
+  </p:clrMapOvr>
+</p:sld>
+</file>
+
+<file path=ppt/slides/slide11.xml><?xml version="1.0" encoding="utf-8"?>
+<p:sld xmlns:a="http://schemas.openxmlformats.org/drawingml/2006/main" xmlns:r="http://schemas.openxmlformats.org/officeDocument/2006/relationships" xmlns:p="http://schemas.openxmlformats.org/presentationml/2006/main">
+  <p:cSld>
+    <p:spTree>
+      <p:nvGrpSpPr>
+        <p:cNvPr id="1" name=""/>
+        <p:cNvGrpSpPr/>
+        <p:nvPr/>
+      </p:nvGrpSpPr>
+      <p:grpSpPr>
+        <a:xfrm>
+          <a:off x="0" y="0"/>
+          <a:ext cx="0" cy="0"/>
+          <a:chOff x="0" y="0"/>
+          <a:chExt cx="0" cy="0"/>
+        </a:xfrm>
+      </p:grpSpPr>
+      <p:pic>
+        <p:nvPicPr>
+          <p:cNvPr id="7" name="Espace réservé du contenu 6">
+            <a:extLst>
+              <a:ext uri="{FF2B5EF4-FFF2-40B4-BE49-F238E27FC236}">
+                <a16:creationId xmlns:a16="http://schemas.microsoft.com/office/drawing/2014/main" id="{2EDAF3E5-5BBB-006D-E871-1BB4D70D5404}"/>
+              </a:ext>
+            </a:extLst>
+          </p:cNvPr>
+          <p:cNvPicPr>
+            <a:picLocks noGrp="1" noChangeAspect="1"/>
+          </p:cNvPicPr>
+          <p:nvPr>
+            <p:ph idx="1"/>
+          </p:nvPr>
+        </p:nvPicPr>
+        <p:blipFill>
+          <a:blip r:embed="rId2">
+            <a:extLst>
+              <a:ext uri="{28A0092B-C50C-407E-A947-70E740481C1C}">
+                <a14:useLocalDpi xmlns:a14="http://schemas.microsoft.com/office/drawing/2010/main" val="0"/>
+              </a:ext>
+            </a:extLst>
+          </a:blip>
+          <a:stretch>
+            <a:fillRect/>
+          </a:stretch>
+        </p:blipFill>
+        <p:spPr>
+          <a:xfrm>
+            <a:off x="574826" y="799465"/>
+            <a:ext cx="7140908" cy="4351338"/>
+          </a:xfrm>
+        </p:spPr>
+      </p:pic>
+      <p:sp>
+        <p:nvSpPr>
+          <p:cNvPr id="8" name="ZoneTexte 7">
+            <a:extLst>
+              <a:ext uri="{FF2B5EF4-FFF2-40B4-BE49-F238E27FC236}">
+                <a16:creationId xmlns:a16="http://schemas.microsoft.com/office/drawing/2014/main" id="{76F39CD7-AF51-8F06-3F0E-8951150CD187}"/>
+              </a:ext>
+            </a:extLst>
+          </p:cNvPr>
+          <p:cNvSpPr txBox="1"/>
+          <p:nvPr/>
+        </p:nvSpPr>
+        <p:spPr>
+          <a:xfrm>
+            <a:off x="8249920" y="2651760"/>
+            <a:ext cx="2895600" cy="923330"/>
+          </a:xfrm>
+          <a:prstGeom prst="rect">
+            <a:avLst/>
+          </a:prstGeom>
+          <a:noFill/>
+        </p:spPr>
+        <p:txBody>
+          <a:bodyPr wrap="square" rtlCol="0">
+            <a:spAutoFit/>
+          </a:bodyPr>
+          <a:lstStyle/>
+          <a:p>
+            <a:r>
+              <a:rPr lang="fr-FR" dirty="0"/>
+              <a:t>Extrait du code permettant la </a:t>
+            </a:r>
+            <a:r>
+              <a:rPr lang="fr-FR" dirty="0" err="1"/>
+              <a:t>creation</a:t>
+            </a:r>
+            <a:r>
+              <a:rPr lang="fr-FR" dirty="0"/>
+              <a:t> des cartes de produit ( image , prix )</a:t>
+            </a:r>
+          </a:p>
+        </p:txBody>
+      </p:sp>
+    </p:spTree>
+    <p:extLst>
+      <p:ext uri="{BB962C8B-B14F-4D97-AF65-F5344CB8AC3E}">
+        <p14:creationId xmlns:p14="http://schemas.microsoft.com/office/powerpoint/2010/main" val="4029428956"/>
+      </p:ext>
+    </p:extLst>
+  </p:cSld>
+  <p:clrMapOvr>
+    <a:masterClrMapping/>
+  </p:clrMapOvr>
+</p:sld>
+</file>
+
+<file path=ppt/slides/slide12.xml><?xml version="1.0" encoding="utf-8"?>
+<p:sld xmlns:a="http://schemas.openxmlformats.org/drawingml/2006/main" xmlns:r="http://schemas.openxmlformats.org/officeDocument/2006/relationships" xmlns:p="http://schemas.openxmlformats.org/presentationml/2006/main">
+  <p:cSld>
+    <p:spTree>
+      <p:nvGrpSpPr>
+        <p:cNvPr id="1" name=""/>
+        <p:cNvGrpSpPr/>
+        <p:nvPr/>
+      </p:nvGrpSpPr>
+      <p:grpSpPr>
+        <a:xfrm>
+          <a:off x="0" y="0"/>
+          <a:ext cx="0" cy="0"/>
+          <a:chOff x="0" y="0"/>
+          <a:chExt cx="0" cy="0"/>
+        </a:xfrm>
+      </p:grpSpPr>
+      <p:sp>
+        <p:nvSpPr>
+          <p:cNvPr id="2" name="Titre 1">
+            <a:extLst>
+              <a:ext uri="{FF2B5EF4-FFF2-40B4-BE49-F238E27FC236}">
+                <a16:creationId xmlns:a16="http://schemas.microsoft.com/office/drawing/2014/main" id="{19B852A3-D6CA-F10A-1F41-30E207ADBAAD}"/>
+              </a:ext>
+            </a:extLst>
+          </p:cNvPr>
+          <p:cNvSpPr>
+            <a:spLocks noGrp="1"/>
+          </p:cNvSpPr>
+          <p:nvPr>
+            <p:ph type="title"/>
+          </p:nvPr>
+        </p:nvSpPr>
+        <p:spPr/>
+        <p:txBody>
+          <a:bodyPr/>
+          <a:lstStyle/>
+          <a:p>
+            <a:r>
+              <a:rPr lang="fr-FR" dirty="0"/>
+              <a:t>DEPLOIMENT DES DIFFERENTES PLATFORME</a:t>
+            </a:r>
+          </a:p>
+        </p:txBody>
+      </p:sp>
+      <p:sp>
+        <p:nvSpPr>
+          <p:cNvPr id="3" name="Espace réservé du contenu 2">
+            <a:extLst>
+              <a:ext uri="{FF2B5EF4-FFF2-40B4-BE49-F238E27FC236}">
+                <a16:creationId xmlns:a16="http://schemas.microsoft.com/office/drawing/2014/main" id="{30FFA542-3C72-84C8-175B-D75506930B25}"/>
+              </a:ext>
+            </a:extLst>
+          </p:cNvPr>
+          <p:cNvSpPr>
+            <a:spLocks noGrp="1"/>
+          </p:cNvSpPr>
+          <p:nvPr>
+            <p:ph idx="1"/>
+          </p:nvPr>
+        </p:nvSpPr>
+        <p:spPr/>
+        <p:txBody>
+          <a:bodyPr/>
+          <a:lstStyle/>
+          <a:p>
+            <a:pPr marL="0" indent="0">
+              <a:buNone/>
+            </a:pPr>
+            <a:r>
+              <a:rPr lang="fr-FR" dirty="0"/>
+              <a:t>Pour le </a:t>
+            </a:r>
+            <a:r>
+              <a:rPr lang="fr-FR" dirty="0" err="1"/>
+              <a:t>deploiement</a:t>
+            </a:r>
+            <a:r>
+              <a:rPr lang="fr-FR" dirty="0"/>
+              <a:t> du front:</a:t>
+            </a:r>
+          </a:p>
+          <a:p>
+            <a:r>
+              <a:rPr lang="fr-FR" dirty="0"/>
+              <a:t> je commence d’abord par mettre a jour le VM</a:t>
+            </a:r>
+            <a:br>
+              <a:rPr lang="fr-FR" dirty="0"/>
+            </a:br>
+            <a:br>
+              <a:rPr lang="fr-FR" dirty="0"/>
+            </a:br>
+            <a:r>
+              <a:rPr lang="fr-FR" dirty="0"/>
+              <a:t>avec un </a:t>
+            </a:r>
+            <a:r>
+              <a:rPr lang="fr-FR" dirty="0">
+                <a:solidFill>
+                  <a:schemeClr val="accent2"/>
+                </a:solidFill>
+              </a:rPr>
+              <a:t>: </a:t>
+            </a:r>
+            <a:r>
+              <a:rPr lang="fr-FR" dirty="0" err="1">
+                <a:solidFill>
+                  <a:schemeClr val="accent2"/>
+                </a:solidFill>
+              </a:rPr>
+              <a:t>sudo</a:t>
+            </a:r>
+            <a:r>
+              <a:rPr lang="fr-FR" dirty="0">
+                <a:solidFill>
+                  <a:schemeClr val="accent2"/>
+                </a:solidFill>
+              </a:rPr>
+              <a:t> </a:t>
+            </a:r>
+            <a:r>
+              <a:rPr lang="fr-FR" dirty="0" err="1">
+                <a:solidFill>
+                  <a:schemeClr val="accent2"/>
+                </a:solidFill>
+              </a:rPr>
+              <a:t>apt</a:t>
+            </a:r>
+            <a:r>
+              <a:rPr lang="fr-FR" dirty="0">
+                <a:solidFill>
+                  <a:schemeClr val="accent2"/>
+                </a:solidFill>
+              </a:rPr>
+              <a:t> update </a:t>
+            </a:r>
+            <a:r>
+              <a:rPr lang="fr-FR" dirty="0" err="1">
+                <a:solidFill>
+                  <a:schemeClr val="accent2"/>
+                </a:solidFill>
+              </a:rPr>
+              <a:t>sudo</a:t>
+            </a:r>
+            <a:r>
+              <a:rPr lang="fr-FR" dirty="0">
+                <a:solidFill>
+                  <a:schemeClr val="accent2"/>
+                </a:solidFill>
+              </a:rPr>
+              <a:t> </a:t>
+            </a:r>
+            <a:r>
+              <a:rPr lang="fr-FR" dirty="0" err="1">
+                <a:solidFill>
+                  <a:schemeClr val="accent2"/>
+                </a:solidFill>
+              </a:rPr>
+              <a:t>apt</a:t>
+            </a:r>
+            <a:r>
+              <a:rPr lang="fr-FR" dirty="0">
+                <a:solidFill>
+                  <a:schemeClr val="accent2"/>
+                </a:solidFill>
+              </a:rPr>
+              <a:t> upgrade —y</a:t>
+            </a:r>
+          </a:p>
+          <a:p>
+            <a:r>
+              <a:rPr lang="fr-FR" dirty="0"/>
+              <a:t>Puis j installe </a:t>
+            </a:r>
+            <a:r>
+              <a:rPr lang="fr-FR" dirty="0" err="1"/>
+              <a:t>node</a:t>
+            </a:r>
+            <a:r>
+              <a:rPr lang="fr-FR" dirty="0"/>
+              <a:t> </a:t>
+            </a:r>
+            <a:r>
+              <a:rPr lang="fr-FR" dirty="0" err="1"/>
+              <a:t>js</a:t>
+            </a:r>
+            <a:r>
+              <a:rPr lang="fr-FR" dirty="0"/>
+              <a:t>:</a:t>
+            </a:r>
+          </a:p>
+          <a:p>
+            <a:pPr marL="0" indent="0">
+              <a:buNone/>
+            </a:pPr>
+            <a:r>
+              <a:rPr lang="fr-FR" dirty="0">
+                <a:solidFill>
+                  <a:schemeClr val="accent2"/>
+                </a:solidFill>
+              </a:rPr>
+              <a:t> </a:t>
+            </a:r>
+            <a:r>
+              <a:rPr lang="fr-FR" dirty="0" err="1">
+                <a:solidFill>
+                  <a:schemeClr val="accent2"/>
+                </a:solidFill>
+              </a:rPr>
+              <a:t>curl</a:t>
+            </a:r>
+            <a:r>
+              <a:rPr lang="fr-FR" dirty="0">
+                <a:solidFill>
+                  <a:schemeClr val="accent2"/>
+                </a:solidFill>
+              </a:rPr>
+              <a:t> —</a:t>
+            </a:r>
+            <a:r>
+              <a:rPr lang="fr-FR" dirty="0" err="1">
+                <a:solidFill>
+                  <a:schemeClr val="accent2"/>
+                </a:solidFill>
+              </a:rPr>
+              <a:t>fsSL</a:t>
+            </a:r>
+            <a:r>
+              <a:rPr lang="fr-FR" dirty="0">
+                <a:solidFill>
+                  <a:schemeClr val="accent2"/>
+                </a:solidFill>
+              </a:rPr>
+              <a:t> https://deb.nodesource.com/setup_20.x I </a:t>
+            </a:r>
+            <a:r>
+              <a:rPr lang="fr-FR" dirty="0" err="1">
+                <a:solidFill>
+                  <a:schemeClr val="accent2"/>
+                </a:solidFill>
+              </a:rPr>
+              <a:t>sudo</a:t>
+            </a:r>
+            <a:r>
+              <a:rPr lang="fr-FR" dirty="0">
+                <a:solidFill>
+                  <a:schemeClr val="accent2"/>
+                </a:solidFill>
+              </a:rPr>
+              <a:t> —E </a:t>
+            </a:r>
+            <a:r>
+              <a:rPr lang="fr-FR" dirty="0" err="1">
+                <a:solidFill>
+                  <a:schemeClr val="accent2"/>
+                </a:solidFill>
+              </a:rPr>
+              <a:t>bash</a:t>
+            </a:r>
+            <a:r>
+              <a:rPr lang="fr-FR" dirty="0">
+                <a:solidFill>
+                  <a:schemeClr val="accent2"/>
+                </a:solidFill>
+              </a:rPr>
+              <a:t> —</a:t>
+            </a:r>
+          </a:p>
+          <a:p>
+            <a:pPr marL="0" indent="0">
+              <a:buNone/>
+            </a:pPr>
+            <a:endParaRPr lang="fr-FR" dirty="0">
+              <a:solidFill>
+                <a:schemeClr val="accent2"/>
+              </a:solidFill>
+            </a:endParaRPr>
+          </a:p>
+        </p:txBody>
+      </p:sp>
+    </p:spTree>
+    <p:extLst>
+      <p:ext uri="{BB962C8B-B14F-4D97-AF65-F5344CB8AC3E}">
+        <p14:creationId xmlns:p14="http://schemas.microsoft.com/office/powerpoint/2010/main" val="3049145459"/>
+      </p:ext>
+    </p:extLst>
+  </p:cSld>
+  <p:clrMapOvr>
+    <a:masterClrMapping/>
+  </p:clrMapOvr>
+</p:sld>
+</file>
+
+<file path=ppt/slides/slide13.xml><?xml version="1.0" encoding="utf-8"?>
+<p:sld xmlns:a="http://schemas.openxmlformats.org/drawingml/2006/main" xmlns:r="http://schemas.openxmlformats.org/officeDocument/2006/relationships" xmlns:p="http://schemas.openxmlformats.org/presentationml/2006/main">
+  <p:cSld>
+    <p:spTree>
+      <p:nvGrpSpPr>
+        <p:cNvPr id="1" name=""/>
+        <p:cNvGrpSpPr/>
+        <p:nvPr/>
+      </p:nvGrpSpPr>
+      <p:grpSpPr>
+        <a:xfrm>
+          <a:off x="0" y="0"/>
+          <a:ext cx="0" cy="0"/>
+          <a:chOff x="0" y="0"/>
+          <a:chExt cx="0" cy="0"/>
+        </a:xfrm>
+      </p:grpSpPr>
+      <p:sp>
+        <p:nvSpPr>
+          <p:cNvPr id="3" name="Espace réservé du contenu 2">
+            <a:extLst>
+              <a:ext uri="{FF2B5EF4-FFF2-40B4-BE49-F238E27FC236}">
+                <a16:creationId xmlns:a16="http://schemas.microsoft.com/office/drawing/2014/main" id="{517EB609-9CDB-CA21-E7AE-576ECE2D4C5F}"/>
+              </a:ext>
+            </a:extLst>
+          </p:cNvPr>
+          <p:cNvSpPr>
+            <a:spLocks noGrp="1"/>
+          </p:cNvSpPr>
+          <p:nvPr>
+            <p:ph idx="1"/>
+          </p:nvPr>
+        </p:nvSpPr>
+        <p:spPr/>
+        <p:txBody>
+          <a:bodyPr/>
+          <a:lstStyle/>
+          <a:p>
+            <a:r>
+              <a:rPr lang="fr-FR" dirty="0"/>
+              <a:t>Je </a:t>
+            </a:r>
+            <a:r>
+              <a:rPr lang="fr-FR" dirty="0" err="1"/>
+              <a:t>verifie</a:t>
+            </a:r>
+            <a:r>
+              <a:rPr lang="fr-FR" dirty="0"/>
+              <a:t> l’installation de </a:t>
+            </a:r>
+            <a:r>
+              <a:rPr lang="fr-FR" dirty="0" err="1"/>
+              <a:t>node</a:t>
+            </a:r>
+            <a:r>
+              <a:rPr lang="fr-FR" dirty="0"/>
+              <a:t> </a:t>
+            </a:r>
+            <a:r>
+              <a:rPr lang="fr-FR" dirty="0" err="1"/>
+              <a:t>js</a:t>
+            </a:r>
+            <a:r>
+              <a:rPr lang="fr-FR" dirty="0"/>
+              <a:t> et de </a:t>
+            </a:r>
+            <a:r>
+              <a:rPr lang="fr-FR" dirty="0" err="1"/>
+              <a:t>npm</a:t>
+            </a:r>
+            <a:r>
+              <a:rPr lang="fr-FR" dirty="0"/>
+              <a:t> sur la machine</a:t>
+            </a:r>
+          </a:p>
+          <a:p>
+            <a:endParaRPr lang="fr-FR" dirty="0"/>
+          </a:p>
+          <a:p>
+            <a:endParaRPr lang="fr-FR" dirty="0"/>
+          </a:p>
+          <a:p>
+            <a:endParaRPr lang="fr-FR" dirty="0"/>
+          </a:p>
+          <a:p>
+            <a:r>
+              <a:rPr lang="fr-FR" dirty="0"/>
+              <a:t>Et j installe </a:t>
+            </a:r>
+            <a:r>
+              <a:rPr lang="fr-FR" dirty="0" err="1"/>
+              <a:t>Angular</a:t>
+            </a:r>
+            <a:r>
+              <a:rPr lang="fr-FR" dirty="0"/>
+              <a:t> 18</a:t>
+            </a:r>
+          </a:p>
+          <a:p>
+            <a:pPr marL="0" indent="0">
+              <a:buNone/>
+            </a:pPr>
+            <a:r>
+              <a:rPr lang="fr-FR" dirty="0"/>
+              <a:t>  </a:t>
+            </a:r>
+            <a:r>
+              <a:rPr lang="fr-FR" dirty="0" err="1">
+                <a:solidFill>
+                  <a:schemeClr val="accent2"/>
+                </a:solidFill>
+              </a:rPr>
+              <a:t>npm</a:t>
+            </a:r>
+            <a:r>
+              <a:rPr lang="fr-FR" dirty="0">
+                <a:solidFill>
+                  <a:schemeClr val="accent2"/>
+                </a:solidFill>
+              </a:rPr>
+              <a:t> </a:t>
+            </a:r>
+            <a:r>
+              <a:rPr lang="fr-FR" dirty="0" err="1">
+                <a:solidFill>
+                  <a:schemeClr val="accent2"/>
+                </a:solidFill>
+              </a:rPr>
+              <a:t>install</a:t>
+            </a:r>
+            <a:r>
+              <a:rPr lang="fr-FR" dirty="0">
+                <a:solidFill>
+                  <a:schemeClr val="accent2"/>
+                </a:solidFill>
+              </a:rPr>
+              <a:t> -g @angular/cli@18</a:t>
+            </a:r>
+          </a:p>
+          <a:p>
+            <a:pPr marL="0" indent="0">
+              <a:buNone/>
+            </a:pPr>
+            <a:r>
+              <a:rPr lang="fr-FR" dirty="0"/>
+              <a:t> </a:t>
+            </a:r>
+          </a:p>
+        </p:txBody>
+      </p:sp>
+      <p:sp>
+        <p:nvSpPr>
+          <p:cNvPr id="4" name="Titre 1">
+            <a:extLst>
+              <a:ext uri="{FF2B5EF4-FFF2-40B4-BE49-F238E27FC236}">
+                <a16:creationId xmlns:a16="http://schemas.microsoft.com/office/drawing/2014/main" id="{ED18BCBE-E4DA-C37E-B6A8-C4F5C05C6FC6}"/>
+              </a:ext>
+            </a:extLst>
+          </p:cNvPr>
+          <p:cNvSpPr>
+            <a:spLocks noGrp="1"/>
+          </p:cNvSpPr>
+          <p:nvPr>
+            <p:ph type="title"/>
+          </p:nvPr>
+        </p:nvSpPr>
+        <p:spPr>
+          <a:xfrm>
+            <a:off x="838200" y="365125"/>
+            <a:ext cx="10515600" cy="1325563"/>
+          </a:xfrm>
+        </p:spPr>
+        <p:txBody>
+          <a:bodyPr/>
+          <a:lstStyle/>
+          <a:p>
+            <a:r>
+              <a:rPr lang="fr-FR" dirty="0"/>
+              <a:t>DEPLOIMENT DES DIFFERENTES PLATFORME</a:t>
+            </a:r>
+          </a:p>
+        </p:txBody>
+      </p:sp>
+      <p:pic>
+        <p:nvPicPr>
+          <p:cNvPr id="6" name="Image 5">
+            <a:extLst>
+              <a:ext uri="{FF2B5EF4-FFF2-40B4-BE49-F238E27FC236}">
+                <a16:creationId xmlns:a16="http://schemas.microsoft.com/office/drawing/2014/main" id="{4BA811EE-E307-3FCD-68A3-2390FED73FCB}"/>
+              </a:ext>
+            </a:extLst>
+          </p:cNvPr>
+          <p:cNvPicPr>
+            <a:picLocks noChangeAspect="1"/>
+          </p:cNvPicPr>
+          <p:nvPr/>
+        </p:nvPicPr>
+        <p:blipFill>
+          <a:blip r:embed="rId2">
+            <a:extLst>
+              <a:ext uri="{28A0092B-C50C-407E-A947-70E740481C1C}">
+                <a14:useLocalDpi xmlns:a14="http://schemas.microsoft.com/office/drawing/2010/main" val="0"/>
+              </a:ext>
+            </a:extLst>
+          </a:blip>
+          <a:stretch>
+            <a:fillRect/>
+          </a:stretch>
+        </p:blipFill>
+        <p:spPr>
+          <a:xfrm>
+            <a:off x="1077253" y="2724052"/>
+            <a:ext cx="4896533" cy="704948"/>
+          </a:xfrm>
+          <a:prstGeom prst="rect">
+            <a:avLst/>
+          </a:prstGeom>
+        </p:spPr>
+      </p:pic>
+    </p:spTree>
+    <p:extLst>
+      <p:ext uri="{BB962C8B-B14F-4D97-AF65-F5344CB8AC3E}">
+        <p14:creationId xmlns:p14="http://schemas.microsoft.com/office/powerpoint/2010/main" val="3504622460"/>
+      </p:ext>
+    </p:extLst>
+  </p:cSld>
+  <p:clrMapOvr>
+    <a:masterClrMapping/>
+  </p:clrMapOvr>
+</p:sld>
+</file>
+
+<file path=ppt/slides/slide14.xml><?xml version="1.0" encoding="utf-8"?>
+<p:sld xmlns:a="http://schemas.openxmlformats.org/drawingml/2006/main" xmlns:r="http://schemas.openxmlformats.org/officeDocument/2006/relationships" xmlns:p="http://schemas.openxmlformats.org/presentationml/2006/main">
+  <p:cSld>
+    <p:spTree>
+      <p:nvGrpSpPr>
+        <p:cNvPr id="1" name=""/>
+        <p:cNvGrpSpPr/>
+        <p:nvPr/>
+      </p:nvGrpSpPr>
+      <p:grpSpPr>
+        <a:xfrm>
+          <a:off x="0" y="0"/>
+          <a:ext cx="0" cy="0"/>
+          <a:chOff x="0" y="0"/>
+          <a:chExt cx="0" cy="0"/>
+        </a:xfrm>
+      </p:grpSpPr>
+      <p:sp>
+        <p:nvSpPr>
+          <p:cNvPr id="2" name="Titre 1">
+            <a:extLst>
+              <a:ext uri="{FF2B5EF4-FFF2-40B4-BE49-F238E27FC236}">
+                <a16:creationId xmlns:a16="http://schemas.microsoft.com/office/drawing/2014/main" id="{19118D11-E842-3A36-9C04-6B6254FDBDEB}"/>
+              </a:ext>
+            </a:extLst>
+          </p:cNvPr>
+          <p:cNvSpPr>
+            <a:spLocks noGrp="1"/>
+          </p:cNvSpPr>
+          <p:nvPr>
+            <p:ph type="title"/>
+          </p:nvPr>
+        </p:nvSpPr>
+        <p:spPr/>
+        <p:txBody>
+          <a:bodyPr/>
+          <a:lstStyle/>
+          <a:p>
+            <a:r>
+              <a:rPr lang="fr-FR" dirty="0"/>
+              <a:t>DEPLOIMENT DES DIFFERENTES PLATFORME</a:t>
+            </a:r>
+          </a:p>
+        </p:txBody>
+      </p:sp>
+      <p:sp>
+        <p:nvSpPr>
+          <p:cNvPr id="3" name="Espace réservé du contenu 2">
+            <a:extLst>
+              <a:ext uri="{FF2B5EF4-FFF2-40B4-BE49-F238E27FC236}">
+                <a16:creationId xmlns:a16="http://schemas.microsoft.com/office/drawing/2014/main" id="{C7EA5FBA-3E35-8A13-2BDD-E9774A62999C}"/>
+              </a:ext>
+            </a:extLst>
+          </p:cNvPr>
+          <p:cNvSpPr>
+            <a:spLocks noGrp="1"/>
+          </p:cNvSpPr>
+          <p:nvPr>
+            <p:ph idx="1"/>
+          </p:nvPr>
+        </p:nvSpPr>
+        <p:spPr/>
+        <p:txBody>
+          <a:bodyPr/>
+          <a:lstStyle/>
+          <a:p>
+            <a:r>
+              <a:rPr lang="fr-FR" dirty="0"/>
+              <a:t>Je clone le repo contenant mon front </a:t>
+            </a:r>
+            <a:r>
+              <a:rPr lang="fr-FR" dirty="0" err="1"/>
+              <a:t>angular</a:t>
+            </a:r>
+            <a:r>
+              <a:rPr lang="fr-FR" dirty="0"/>
+              <a:t> dans mon serveur </a:t>
+            </a:r>
+            <a:br>
+              <a:rPr lang="fr-FR" dirty="0"/>
+            </a:br>
+            <a:br>
+              <a:rPr lang="fr-FR" dirty="0"/>
+            </a:br>
+            <a:r>
+              <a:rPr lang="fr-FR" dirty="0">
+                <a:solidFill>
+                  <a:schemeClr val="accent2"/>
+                </a:solidFill>
+              </a:rPr>
+              <a:t>git clone </a:t>
+            </a:r>
+            <a:r>
+              <a:rPr lang="fr-FR" dirty="0">
+                <a:solidFill>
+                  <a:schemeClr val="accent2"/>
+                </a:solidFill>
+                <a:hlinkClick r:id="rId2"/>
+              </a:rPr>
+              <a:t>https://github.com/Soosuukee/shopcartangular.git</a:t>
+            </a:r>
+            <a:br>
+              <a:rPr lang="fr-FR" dirty="0">
+                <a:solidFill>
+                  <a:schemeClr val="accent2"/>
+                </a:solidFill>
+              </a:rPr>
+            </a:br>
+            <a:endParaRPr lang="fr-FR" dirty="0">
+              <a:solidFill>
+                <a:schemeClr val="accent2"/>
+              </a:solidFill>
+            </a:endParaRPr>
+          </a:p>
+          <a:p>
+            <a:r>
+              <a:rPr lang="fr-FR" dirty="0"/>
+              <a:t>Et je me mets au sein de celui-ci </a:t>
+            </a:r>
+          </a:p>
+          <a:p>
+            <a:pPr marL="0" indent="0">
+              <a:buNone/>
+            </a:pPr>
+            <a:r>
+              <a:rPr lang="fr-FR" dirty="0">
+                <a:solidFill>
+                  <a:schemeClr val="accent2"/>
+                </a:solidFill>
+              </a:rPr>
+              <a:t>  cd </a:t>
+            </a:r>
+            <a:r>
+              <a:rPr lang="fr-FR" dirty="0" err="1">
+                <a:solidFill>
+                  <a:schemeClr val="accent2"/>
+                </a:solidFill>
+              </a:rPr>
+              <a:t>shopcartangular</a:t>
+            </a:r>
+            <a:r>
+              <a:rPr lang="fr-FR" dirty="0">
+                <a:solidFill>
+                  <a:schemeClr val="accent2"/>
+                </a:solidFill>
+              </a:rPr>
+              <a:t> </a:t>
+            </a:r>
+          </a:p>
+        </p:txBody>
+      </p:sp>
+    </p:spTree>
+    <p:extLst>
+      <p:ext uri="{BB962C8B-B14F-4D97-AF65-F5344CB8AC3E}">
+        <p14:creationId xmlns:p14="http://schemas.microsoft.com/office/powerpoint/2010/main" val="725607890"/>
+      </p:ext>
+    </p:extLst>
+  </p:cSld>
+  <p:clrMapOvr>
+    <a:masterClrMapping/>
+  </p:clrMapOvr>
+</p:sld>
+</file>
+
+<file path=ppt/slides/slide15.xml><?xml version="1.0" encoding="utf-8"?>
+<p:sld xmlns:a="http://schemas.openxmlformats.org/drawingml/2006/main" xmlns:r="http://schemas.openxmlformats.org/officeDocument/2006/relationships" xmlns:p="http://schemas.openxmlformats.org/presentationml/2006/main">
+  <p:cSld>
+    <p:spTree>
+      <p:nvGrpSpPr>
+        <p:cNvPr id="1" name=""/>
+        <p:cNvGrpSpPr/>
+        <p:nvPr/>
+      </p:nvGrpSpPr>
+      <p:grpSpPr>
+        <a:xfrm>
+          <a:off x="0" y="0"/>
+          <a:ext cx="0" cy="0"/>
+          <a:chOff x="0" y="0"/>
+          <a:chExt cx="0" cy="0"/>
+        </a:xfrm>
+      </p:grpSpPr>
+      <p:sp>
+        <p:nvSpPr>
+          <p:cNvPr id="2" name="Titre 1">
+            <a:extLst>
+              <a:ext uri="{FF2B5EF4-FFF2-40B4-BE49-F238E27FC236}">
+                <a16:creationId xmlns:a16="http://schemas.microsoft.com/office/drawing/2014/main" id="{18F11D77-4B28-BD28-060F-4FD8AC2F8E12}"/>
+              </a:ext>
+            </a:extLst>
+          </p:cNvPr>
+          <p:cNvSpPr>
+            <a:spLocks noGrp="1"/>
+          </p:cNvSpPr>
+          <p:nvPr>
+            <p:ph type="title"/>
+          </p:nvPr>
+        </p:nvSpPr>
+        <p:spPr/>
+        <p:txBody>
+          <a:bodyPr/>
+          <a:lstStyle/>
+          <a:p>
+            <a:r>
+              <a:rPr lang="fr-FR" dirty="0"/>
+              <a:t>DEPLOIMENT DES DIFFERENTES PLATFORME</a:t>
+            </a:r>
+          </a:p>
+        </p:txBody>
+      </p:sp>
+      <p:sp>
+        <p:nvSpPr>
+          <p:cNvPr id="3" name="Espace réservé du contenu 2">
+            <a:extLst>
+              <a:ext uri="{FF2B5EF4-FFF2-40B4-BE49-F238E27FC236}">
+                <a16:creationId xmlns:a16="http://schemas.microsoft.com/office/drawing/2014/main" id="{20F401EA-AA48-E189-ACF9-C29A4925F628}"/>
+              </a:ext>
+            </a:extLst>
+          </p:cNvPr>
+          <p:cNvSpPr>
+            <a:spLocks noGrp="1"/>
+          </p:cNvSpPr>
+          <p:nvPr>
+            <p:ph idx="1"/>
+          </p:nvPr>
+        </p:nvSpPr>
+        <p:spPr/>
+        <p:txBody>
+          <a:bodyPr/>
+          <a:lstStyle/>
+          <a:p>
+            <a:r>
+              <a:rPr lang="fr-FR" dirty="0"/>
+              <a:t>Une fois dans mon dossier , je lance le </a:t>
+            </a:r>
+            <a:r>
+              <a:rPr lang="fr-FR" dirty="0" err="1"/>
+              <a:t>build</a:t>
+            </a:r>
+            <a:r>
+              <a:rPr lang="fr-FR" dirty="0"/>
+              <a:t> de l’application </a:t>
+            </a:r>
+          </a:p>
+          <a:p>
+            <a:endParaRPr lang="fr-FR" dirty="0"/>
+          </a:p>
+          <a:p>
+            <a:endParaRPr lang="fr-FR" dirty="0"/>
+          </a:p>
+          <a:p>
+            <a:endParaRPr lang="fr-FR" dirty="0"/>
+          </a:p>
+          <a:p>
+            <a:endParaRPr lang="fr-FR" dirty="0"/>
+          </a:p>
+          <a:p>
+            <a:endParaRPr lang="fr-FR" dirty="0"/>
+          </a:p>
+          <a:p>
+            <a:endParaRPr lang="fr-FR" dirty="0"/>
+          </a:p>
+          <a:p>
+            <a:r>
+              <a:rPr lang="fr-FR" dirty="0"/>
+              <a:t>Et j installe </a:t>
+            </a:r>
+            <a:r>
+              <a:rPr lang="fr-FR" dirty="0" err="1"/>
+              <a:t>nginx</a:t>
+            </a:r>
+            <a:r>
+              <a:rPr lang="fr-FR" dirty="0"/>
+              <a:t> : </a:t>
+            </a:r>
+            <a:r>
+              <a:rPr lang="en-US" dirty="0" err="1">
+                <a:solidFill>
+                  <a:schemeClr val="accent2"/>
+                </a:solidFill>
+              </a:rPr>
+              <a:t>sudo</a:t>
+            </a:r>
+            <a:r>
+              <a:rPr lang="en-US" dirty="0">
+                <a:solidFill>
+                  <a:schemeClr val="accent2"/>
+                </a:solidFill>
+              </a:rPr>
+              <a:t> apt update &amp;&amp; </a:t>
+            </a:r>
+            <a:r>
+              <a:rPr lang="en-US" dirty="0" err="1">
+                <a:solidFill>
+                  <a:schemeClr val="accent2"/>
+                </a:solidFill>
+              </a:rPr>
+              <a:t>sudo</a:t>
+            </a:r>
+            <a:r>
+              <a:rPr lang="en-US" dirty="0">
+                <a:solidFill>
+                  <a:schemeClr val="accent2"/>
+                </a:solidFill>
+              </a:rPr>
+              <a:t> apt install nginx</a:t>
+            </a:r>
+          </a:p>
+          <a:p>
+            <a:pPr marL="0" indent="0">
+              <a:buNone/>
+            </a:pPr>
+            <a:endParaRPr lang="fr-FR" dirty="0"/>
+          </a:p>
+          <a:p>
+            <a:endParaRPr lang="fr-FR" dirty="0"/>
+          </a:p>
+        </p:txBody>
+      </p:sp>
+      <p:pic>
+        <p:nvPicPr>
+          <p:cNvPr id="5" name="Image 4">
+            <a:extLst>
+              <a:ext uri="{FF2B5EF4-FFF2-40B4-BE49-F238E27FC236}">
+                <a16:creationId xmlns:a16="http://schemas.microsoft.com/office/drawing/2014/main" id="{604DEFFF-0516-C4AD-CB14-7E2E19E55649}"/>
+              </a:ext>
+            </a:extLst>
+          </p:cNvPr>
+          <p:cNvPicPr>
+            <a:picLocks noChangeAspect="1"/>
+          </p:cNvPicPr>
+          <p:nvPr/>
+        </p:nvPicPr>
+        <p:blipFill>
+          <a:blip r:embed="rId2">
+            <a:extLst>
+              <a:ext uri="{28A0092B-C50C-407E-A947-70E740481C1C}">
+                <a14:useLocalDpi xmlns:a14="http://schemas.microsoft.com/office/drawing/2010/main" val="0"/>
+              </a:ext>
+            </a:extLst>
+          </a:blip>
+          <a:stretch>
+            <a:fillRect/>
+          </a:stretch>
+        </p:blipFill>
+        <p:spPr>
+          <a:xfrm>
+            <a:off x="1763791" y="2549673"/>
+            <a:ext cx="7973538" cy="2429214"/>
+          </a:xfrm>
+          <a:prstGeom prst="rect">
+            <a:avLst/>
+          </a:prstGeom>
+        </p:spPr>
+      </p:pic>
+    </p:spTree>
+    <p:extLst>
+      <p:ext uri="{BB962C8B-B14F-4D97-AF65-F5344CB8AC3E}">
+        <p14:creationId xmlns:p14="http://schemas.microsoft.com/office/powerpoint/2010/main" val="3785558719"/>
+      </p:ext>
+    </p:extLst>
+  </p:cSld>
+  <p:clrMapOvr>
+    <a:masterClrMapping/>
+  </p:clrMapOvr>
+</p:sld>
+</file>
+
+<file path=ppt/slides/slide16.xml><?xml version="1.0" encoding="utf-8"?>
+<p:sld xmlns:a="http://schemas.openxmlformats.org/drawingml/2006/main" xmlns:r="http://schemas.openxmlformats.org/officeDocument/2006/relationships" xmlns:p="http://schemas.openxmlformats.org/presentationml/2006/main">
+  <p:cSld>
+    <p:spTree>
+      <p:nvGrpSpPr>
+        <p:cNvPr id="1" name=""/>
+        <p:cNvGrpSpPr/>
+        <p:nvPr/>
+      </p:nvGrpSpPr>
+      <p:grpSpPr>
+        <a:xfrm>
+          <a:off x="0" y="0"/>
+          <a:ext cx="0" cy="0"/>
+          <a:chOff x="0" y="0"/>
+          <a:chExt cx="0" cy="0"/>
+        </a:xfrm>
+      </p:grpSpPr>
+      <p:sp>
+        <p:nvSpPr>
+          <p:cNvPr id="2" name="Titre 1">
+            <a:extLst>
+              <a:ext uri="{FF2B5EF4-FFF2-40B4-BE49-F238E27FC236}">
+                <a16:creationId xmlns:a16="http://schemas.microsoft.com/office/drawing/2014/main" id="{5BBF9DCD-EDF1-B5C6-E841-8A363168A25F}"/>
+              </a:ext>
+            </a:extLst>
+          </p:cNvPr>
+          <p:cNvSpPr>
+            <a:spLocks noGrp="1"/>
+          </p:cNvSpPr>
+          <p:nvPr>
+            <p:ph type="title"/>
+          </p:nvPr>
+        </p:nvSpPr>
+        <p:spPr/>
+        <p:txBody>
+          <a:bodyPr/>
+          <a:lstStyle/>
+          <a:p>
+            <a:r>
+              <a:rPr lang="fr-FR" dirty="0"/>
+              <a:t>DEPLOIMENT DES DIFFERENTES PLATFORME</a:t>
+            </a:r>
+          </a:p>
+        </p:txBody>
+      </p:sp>
+      <p:sp>
+        <p:nvSpPr>
+          <p:cNvPr id="3" name="Espace réservé du contenu 2">
+            <a:extLst>
+              <a:ext uri="{FF2B5EF4-FFF2-40B4-BE49-F238E27FC236}">
+                <a16:creationId xmlns:a16="http://schemas.microsoft.com/office/drawing/2014/main" id="{0F63423A-731F-E370-E347-619EF37C03F0}"/>
+              </a:ext>
+            </a:extLst>
+          </p:cNvPr>
+          <p:cNvSpPr>
+            <a:spLocks noGrp="1"/>
+          </p:cNvSpPr>
+          <p:nvPr>
+            <p:ph idx="1"/>
+          </p:nvPr>
+        </p:nvSpPr>
+        <p:spPr/>
+        <p:txBody>
+          <a:bodyPr/>
+          <a:lstStyle/>
+          <a:p>
+            <a:r>
+              <a:rPr lang="fr-FR" dirty="0"/>
+              <a:t>Une fois </a:t>
+            </a:r>
+            <a:r>
+              <a:rPr lang="fr-FR" dirty="0" err="1"/>
+              <a:t>nginx</a:t>
+            </a:r>
+            <a:r>
+              <a:rPr lang="fr-FR" dirty="0"/>
+              <a:t> installer je vais copier le </a:t>
+            </a:r>
+            <a:r>
+              <a:rPr lang="fr-FR" dirty="0" err="1"/>
+              <a:t>build</a:t>
+            </a:r>
+            <a:r>
+              <a:rPr lang="fr-FR" dirty="0"/>
+              <a:t> dans le dossier web de celui-ci :</a:t>
+            </a:r>
+            <a:br>
+              <a:rPr lang="fr-FR" dirty="0"/>
+            </a:br>
+            <a:br>
+              <a:rPr lang="fr-FR" dirty="0"/>
+            </a:br>
+            <a:r>
+              <a:rPr lang="en-US" dirty="0" err="1">
+                <a:solidFill>
+                  <a:schemeClr val="accent2"/>
+                </a:solidFill>
+              </a:rPr>
+              <a:t>sudo</a:t>
+            </a:r>
+            <a:r>
+              <a:rPr lang="en-US" dirty="0">
+                <a:solidFill>
+                  <a:schemeClr val="accent2"/>
+                </a:solidFill>
+              </a:rPr>
+              <a:t> cp -r /home/</a:t>
+            </a:r>
+            <a:r>
+              <a:rPr lang="en-US" dirty="0" err="1">
+                <a:solidFill>
+                  <a:schemeClr val="accent2"/>
+                </a:solidFill>
+              </a:rPr>
+              <a:t>florian</a:t>
+            </a:r>
+            <a:r>
+              <a:rPr lang="en-US" dirty="0">
+                <a:solidFill>
+                  <a:schemeClr val="accent2"/>
+                </a:solidFill>
+              </a:rPr>
+              <a:t>/</a:t>
+            </a:r>
+            <a:r>
+              <a:rPr lang="en-US" dirty="0" err="1">
+                <a:solidFill>
+                  <a:schemeClr val="accent2"/>
+                </a:solidFill>
+              </a:rPr>
+              <a:t>shopcartangular</a:t>
+            </a:r>
+            <a:r>
+              <a:rPr lang="en-US" dirty="0">
+                <a:solidFill>
+                  <a:schemeClr val="accent2"/>
+                </a:solidFill>
+              </a:rPr>
+              <a:t>/</a:t>
+            </a:r>
+            <a:r>
+              <a:rPr lang="en-US" dirty="0" err="1">
+                <a:solidFill>
+                  <a:schemeClr val="accent2"/>
+                </a:solidFill>
+              </a:rPr>
+              <a:t>dist</a:t>
+            </a:r>
+            <a:r>
+              <a:rPr lang="en-US" dirty="0">
+                <a:solidFill>
+                  <a:schemeClr val="accent2"/>
+                </a:solidFill>
+              </a:rPr>
+              <a:t>/browser/* /var/www/html/</a:t>
+            </a:r>
+          </a:p>
+          <a:p>
+            <a:r>
+              <a:rPr lang="fr-FR" dirty="0"/>
+              <a:t>Et j accorde les bonnes permissions au dossier </a:t>
+            </a:r>
+            <a:br>
+              <a:rPr lang="fr-FR" dirty="0"/>
+            </a:br>
+            <a:br>
+              <a:rPr lang="fr-FR" dirty="0"/>
+            </a:br>
+            <a:r>
+              <a:rPr lang="pt-BR" dirty="0">
+                <a:solidFill>
+                  <a:schemeClr val="accent2"/>
+                </a:solidFill>
+              </a:rPr>
+              <a:t>sudo chown -R www-data:www-data /var/www/html/ </a:t>
+            </a:r>
+          </a:p>
+          <a:p>
+            <a:pPr marL="0" indent="0">
+              <a:buNone/>
+            </a:pPr>
+            <a:r>
+              <a:rPr lang="pt-BR" dirty="0">
+                <a:solidFill>
+                  <a:schemeClr val="accent2"/>
+                </a:solidFill>
+              </a:rPr>
+              <a:t>   sudo chmod -R 755 /var/www/html/</a:t>
+            </a:r>
+          </a:p>
+          <a:p>
+            <a:endParaRPr lang="en-US" dirty="0"/>
+          </a:p>
+        </p:txBody>
+      </p:sp>
+    </p:spTree>
+    <p:extLst>
+      <p:ext uri="{BB962C8B-B14F-4D97-AF65-F5344CB8AC3E}">
+        <p14:creationId xmlns:p14="http://schemas.microsoft.com/office/powerpoint/2010/main" val="2826977785"/>
+      </p:ext>
+    </p:extLst>
+  </p:cSld>
+  <p:clrMapOvr>
+    <a:masterClrMapping/>
+  </p:clrMapOvr>
+</p:sld>
+</file>
+
+<file path=ppt/slides/slide17.xml><?xml version="1.0" encoding="utf-8"?>
+<p:sld xmlns:a="http://schemas.openxmlformats.org/drawingml/2006/main" xmlns:r="http://schemas.openxmlformats.org/officeDocument/2006/relationships" xmlns:p="http://schemas.openxmlformats.org/presentationml/2006/main">
+  <p:cSld>
+    <p:spTree>
+      <p:nvGrpSpPr>
+        <p:cNvPr id="1" name=""/>
+        <p:cNvGrpSpPr/>
+        <p:nvPr/>
+      </p:nvGrpSpPr>
+      <p:grpSpPr>
+        <a:xfrm>
+          <a:off x="0" y="0"/>
+          <a:ext cx="0" cy="0"/>
+          <a:chOff x="0" y="0"/>
+          <a:chExt cx="0" cy="0"/>
+        </a:xfrm>
+      </p:grpSpPr>
+      <p:sp>
+        <p:nvSpPr>
+          <p:cNvPr id="2" name="Titre 1">
+            <a:extLst>
+              <a:ext uri="{FF2B5EF4-FFF2-40B4-BE49-F238E27FC236}">
+                <a16:creationId xmlns:a16="http://schemas.microsoft.com/office/drawing/2014/main" id="{481726D2-8B96-2CA1-3EDD-59CC8264B4D7}"/>
+              </a:ext>
+            </a:extLst>
+          </p:cNvPr>
+          <p:cNvSpPr>
+            <a:spLocks noGrp="1"/>
+          </p:cNvSpPr>
+          <p:nvPr>
+            <p:ph type="title"/>
+          </p:nvPr>
+        </p:nvSpPr>
+        <p:spPr/>
+        <p:txBody>
+          <a:bodyPr/>
+          <a:lstStyle/>
+          <a:p>
+            <a:r>
+              <a:rPr lang="fr-FR" dirty="0"/>
+              <a:t>DEPLOIMENT DES DIFFERENTES PLATFORME</a:t>
+            </a:r>
+          </a:p>
+        </p:txBody>
+      </p:sp>
+      <p:sp>
+        <p:nvSpPr>
+          <p:cNvPr id="3" name="Espace réservé du contenu 2">
+            <a:extLst>
+              <a:ext uri="{FF2B5EF4-FFF2-40B4-BE49-F238E27FC236}">
+                <a16:creationId xmlns:a16="http://schemas.microsoft.com/office/drawing/2014/main" id="{3509634E-B9AE-228B-56D6-C1174ABEF975}"/>
+              </a:ext>
+            </a:extLst>
+          </p:cNvPr>
+          <p:cNvSpPr>
+            <a:spLocks noGrp="1"/>
+          </p:cNvSpPr>
+          <p:nvPr>
+            <p:ph idx="1"/>
+          </p:nvPr>
+        </p:nvSpPr>
+        <p:spPr/>
+        <p:txBody>
+          <a:bodyPr>
+            <a:normAutofit/>
+          </a:bodyPr>
+          <a:lstStyle/>
+          <a:p>
+            <a:pPr marL="0" indent="0">
+              <a:buNone/>
+            </a:pPr>
+            <a:r>
+              <a:rPr lang="fr-FR" dirty="0"/>
+              <a:t>La commande </a:t>
+            </a:r>
+            <a:r>
+              <a:rPr lang="fr-FR" dirty="0" err="1">
+                <a:solidFill>
+                  <a:srgbClr val="00B050"/>
+                </a:solidFill>
+              </a:rPr>
+              <a:t>sudo</a:t>
+            </a:r>
+            <a:r>
+              <a:rPr lang="fr-FR" dirty="0">
+                <a:solidFill>
+                  <a:srgbClr val="00B050"/>
+                </a:solidFill>
+              </a:rPr>
+              <a:t> </a:t>
+            </a:r>
+            <a:r>
+              <a:rPr lang="fr-FR" dirty="0" err="1">
+                <a:solidFill>
+                  <a:srgbClr val="00B050"/>
+                </a:solidFill>
+              </a:rPr>
+              <a:t>chown</a:t>
+            </a:r>
+            <a:r>
+              <a:rPr lang="fr-FR" dirty="0">
+                <a:solidFill>
+                  <a:srgbClr val="00B050"/>
+                </a:solidFill>
+              </a:rPr>
+              <a:t> -R </a:t>
+            </a:r>
+            <a:r>
+              <a:rPr lang="fr-FR" dirty="0" err="1">
+                <a:solidFill>
+                  <a:srgbClr val="00B050"/>
+                </a:solidFill>
+              </a:rPr>
+              <a:t>www-data:www-data</a:t>
+            </a:r>
+            <a:r>
+              <a:rPr lang="fr-FR" dirty="0">
+                <a:solidFill>
+                  <a:srgbClr val="00B050"/>
+                </a:solidFill>
+              </a:rPr>
+              <a:t> /var/www/html/ </a:t>
+            </a:r>
+            <a:r>
+              <a:rPr lang="fr-FR" dirty="0"/>
+              <a:t>permet de changer le propriétaire d’un dossier et de tous ses fichiers.</a:t>
+            </a:r>
+          </a:p>
+          <a:p>
+            <a:pPr marL="0" indent="0">
+              <a:buNone/>
+            </a:pPr>
+            <a:r>
+              <a:rPr lang="fr-FR" dirty="0"/>
+              <a:t>Ici, on donne la propriété du dossier /var/www/html/ à l’utilisateur et au groupe www-data, qui est celui utilisé par le serveur web</a:t>
+            </a:r>
+          </a:p>
+          <a:p>
+            <a:pPr marL="0" indent="0">
+              <a:buNone/>
+            </a:pPr>
+            <a:r>
+              <a:rPr lang="fr-FR" dirty="0"/>
+              <a:t> (ici  Nginx). Grâce à ça, le serveur a le droit de gérer les fichiers du site. L’option -R (récursive) signifie que</a:t>
+            </a:r>
+          </a:p>
+          <a:p>
+            <a:pPr marL="0" indent="0">
+              <a:buNone/>
+            </a:pPr>
+            <a:r>
+              <a:rPr lang="fr-FR" dirty="0"/>
+              <a:t>le changement s’applique à tous les sous-dossiers et fichiers à l’intérieur.</a:t>
+            </a:r>
+          </a:p>
+          <a:p>
+            <a:pPr marL="0" indent="0">
+              <a:buNone/>
+            </a:pPr>
+            <a:endParaRPr lang="fr-FR" dirty="0"/>
+          </a:p>
+        </p:txBody>
+      </p:sp>
+    </p:spTree>
+    <p:extLst>
+      <p:ext uri="{BB962C8B-B14F-4D97-AF65-F5344CB8AC3E}">
+        <p14:creationId xmlns:p14="http://schemas.microsoft.com/office/powerpoint/2010/main" val="2537442251"/>
+      </p:ext>
+    </p:extLst>
+  </p:cSld>
+  <p:clrMapOvr>
+    <a:masterClrMapping/>
+  </p:clrMapOvr>
+</p:sld>
+</file>
+
+<file path=ppt/slides/slide18.xml><?xml version="1.0" encoding="utf-8"?>
+<p:sld xmlns:a="http://schemas.openxmlformats.org/drawingml/2006/main" xmlns:r="http://schemas.openxmlformats.org/officeDocument/2006/relationships" xmlns:p="http://schemas.openxmlformats.org/presentationml/2006/main">
+  <p:cSld>
+    <p:spTree>
+      <p:nvGrpSpPr>
+        <p:cNvPr id="1" name=""/>
+        <p:cNvGrpSpPr/>
+        <p:nvPr/>
+      </p:nvGrpSpPr>
+      <p:grpSpPr>
+        <a:xfrm>
+          <a:off x="0" y="0"/>
+          <a:ext cx="0" cy="0"/>
+          <a:chOff x="0" y="0"/>
+          <a:chExt cx="0" cy="0"/>
+        </a:xfrm>
+      </p:grpSpPr>
+      <p:sp>
+        <p:nvSpPr>
+          <p:cNvPr id="2" name="Titre 1">
+            <a:extLst>
+              <a:ext uri="{FF2B5EF4-FFF2-40B4-BE49-F238E27FC236}">
+                <a16:creationId xmlns:a16="http://schemas.microsoft.com/office/drawing/2014/main" id="{B2193FA1-7AB9-DBC5-7959-92922DE6AA3C}"/>
+              </a:ext>
+            </a:extLst>
+          </p:cNvPr>
+          <p:cNvSpPr>
+            <a:spLocks noGrp="1"/>
+          </p:cNvSpPr>
+          <p:nvPr>
+            <p:ph type="title"/>
+          </p:nvPr>
+        </p:nvSpPr>
+        <p:spPr/>
+        <p:txBody>
+          <a:bodyPr/>
+          <a:lstStyle/>
+          <a:p>
+            <a:r>
+              <a:rPr lang="fr-FR" dirty="0"/>
+              <a:t>DEPLOIMENT DES DIFFERENTES PLATFORME</a:t>
+            </a:r>
+          </a:p>
+        </p:txBody>
+      </p:sp>
+      <p:sp>
+        <p:nvSpPr>
+          <p:cNvPr id="3" name="Espace réservé du contenu 2">
+            <a:extLst>
+              <a:ext uri="{FF2B5EF4-FFF2-40B4-BE49-F238E27FC236}">
+                <a16:creationId xmlns:a16="http://schemas.microsoft.com/office/drawing/2014/main" id="{9329FA9F-7BD7-7BD0-626C-AA75AF640D8C}"/>
+              </a:ext>
+            </a:extLst>
+          </p:cNvPr>
+          <p:cNvSpPr>
+            <a:spLocks noGrp="1"/>
+          </p:cNvSpPr>
+          <p:nvPr>
+            <p:ph idx="1"/>
+          </p:nvPr>
+        </p:nvSpPr>
+        <p:spPr/>
+        <p:txBody>
+          <a:bodyPr/>
+          <a:lstStyle/>
+          <a:p>
+            <a:pPr marL="0" indent="0">
+              <a:buNone/>
+            </a:pPr>
+            <a:r>
+              <a:rPr lang="fr-FR" dirty="0"/>
+              <a:t>La commande </a:t>
+            </a:r>
+            <a:r>
+              <a:rPr lang="fr-FR" dirty="0" err="1">
+                <a:solidFill>
+                  <a:srgbClr val="00B050"/>
+                </a:solidFill>
+              </a:rPr>
+              <a:t>sudo</a:t>
+            </a:r>
+            <a:r>
+              <a:rPr lang="fr-FR" dirty="0">
+                <a:solidFill>
+                  <a:srgbClr val="00B050"/>
+                </a:solidFill>
+              </a:rPr>
+              <a:t> chmod -R 755 /var/www/html/ </a:t>
+            </a:r>
+            <a:r>
+              <a:rPr lang="fr-FR" dirty="0"/>
+              <a:t>sert à modifier les droits d’accès d’un dossier et de tout son contenu.</a:t>
+            </a:r>
+          </a:p>
+          <a:p>
+            <a:pPr marL="0" indent="0">
+              <a:buNone/>
+            </a:pPr>
+            <a:r>
+              <a:rPr lang="fr-FR" dirty="0"/>
+              <a:t>Le chiffre 755 signifie que le propriétaire peut lire, écrire et exécuter (7), tandis que les autres peuvent seulement lire</a:t>
+            </a:r>
+          </a:p>
+          <a:p>
+            <a:pPr marL="0" indent="0">
+              <a:buNone/>
+            </a:pPr>
+            <a:r>
+              <a:rPr lang="fr-FR" dirty="0"/>
+              <a:t>et exécuter (5). Cela permet au serveur web d'accéder aux fichiers sans permettre à tout le monde de les modifier.</a:t>
+            </a:r>
+          </a:p>
+          <a:p>
+            <a:pPr marL="0" indent="0">
+              <a:buNone/>
+            </a:pPr>
+            <a:r>
+              <a:rPr lang="fr-FR" dirty="0"/>
+              <a:t>Comme pour la commande précédente, l’option -R applique ces droits à tous les sous-dossiers et fichiers.</a:t>
+            </a:r>
+          </a:p>
+          <a:p>
+            <a:endParaRPr lang="fr-FR" dirty="0"/>
+          </a:p>
+        </p:txBody>
+      </p:sp>
+    </p:spTree>
+    <p:extLst>
+      <p:ext uri="{BB962C8B-B14F-4D97-AF65-F5344CB8AC3E}">
+        <p14:creationId xmlns:p14="http://schemas.microsoft.com/office/powerpoint/2010/main" val="2623115505"/>
+      </p:ext>
+    </p:extLst>
+  </p:cSld>
+  <p:clrMapOvr>
+    <a:masterClrMapping/>
+  </p:clrMapOvr>
+</p:sld>
+</file>
+
+<file path=ppt/slides/slide19.xml><?xml version="1.0" encoding="utf-8"?>
+<p:sld xmlns:a="http://schemas.openxmlformats.org/drawingml/2006/main" xmlns:r="http://schemas.openxmlformats.org/officeDocument/2006/relationships" xmlns:p="http://schemas.openxmlformats.org/presentationml/2006/main">
+  <p:cSld>
+    <p:spTree>
+      <p:nvGrpSpPr>
+        <p:cNvPr id="1" name=""/>
+        <p:cNvGrpSpPr/>
+        <p:nvPr/>
+      </p:nvGrpSpPr>
+      <p:grpSpPr>
+        <a:xfrm>
+          <a:off x="0" y="0"/>
+          <a:ext cx="0" cy="0"/>
+          <a:chOff x="0" y="0"/>
+          <a:chExt cx="0" cy="0"/>
+        </a:xfrm>
+      </p:grpSpPr>
+      <p:sp>
+        <p:nvSpPr>
+          <p:cNvPr id="2" name="Titre 1">
+            <a:extLst>
+              <a:ext uri="{FF2B5EF4-FFF2-40B4-BE49-F238E27FC236}">
+                <a16:creationId xmlns:a16="http://schemas.microsoft.com/office/drawing/2014/main" id="{F564667B-7A73-2B8E-E710-28DF755EDF82}"/>
+              </a:ext>
+            </a:extLst>
+          </p:cNvPr>
+          <p:cNvSpPr>
+            <a:spLocks noGrp="1"/>
+          </p:cNvSpPr>
+          <p:nvPr>
+            <p:ph type="title"/>
+          </p:nvPr>
+        </p:nvSpPr>
+        <p:spPr/>
+        <p:txBody>
+          <a:bodyPr/>
+          <a:lstStyle/>
+          <a:p>
+            <a:r>
+              <a:rPr lang="fr-FR" dirty="0"/>
+              <a:t>DEPLOIMENT DES DIFFERENTES PLATFORME</a:t>
+            </a:r>
+          </a:p>
+        </p:txBody>
+      </p:sp>
+      <p:pic>
+        <p:nvPicPr>
+          <p:cNvPr id="5" name="Espace réservé du contenu 4">
+            <a:extLst>
+              <a:ext uri="{FF2B5EF4-FFF2-40B4-BE49-F238E27FC236}">
+                <a16:creationId xmlns:a16="http://schemas.microsoft.com/office/drawing/2014/main" id="{DC34EEB7-5AFB-4187-DD72-C74724E4F72E}"/>
+              </a:ext>
+            </a:extLst>
+          </p:cNvPr>
+          <p:cNvPicPr>
+            <a:picLocks noGrp="1" noChangeAspect="1"/>
+          </p:cNvPicPr>
+          <p:nvPr>
+            <p:ph idx="1"/>
+          </p:nvPr>
+        </p:nvPicPr>
+        <p:blipFill>
+          <a:blip r:embed="rId2">
+            <a:extLst>
+              <a:ext uri="{28A0092B-C50C-407E-A947-70E740481C1C}">
+                <a14:useLocalDpi xmlns:a14="http://schemas.microsoft.com/office/drawing/2010/main" val="0"/>
+              </a:ext>
+            </a:extLst>
+          </a:blip>
+          <a:stretch>
+            <a:fillRect/>
+          </a:stretch>
+        </p:blipFill>
+        <p:spPr>
+          <a:xfrm>
+            <a:off x="999880" y="1581785"/>
+            <a:ext cx="5559280" cy="4351338"/>
+          </a:xfrm>
+        </p:spPr>
+      </p:pic>
+      <p:sp>
+        <p:nvSpPr>
+          <p:cNvPr id="6" name="ZoneTexte 5">
+            <a:extLst>
+              <a:ext uri="{FF2B5EF4-FFF2-40B4-BE49-F238E27FC236}">
+                <a16:creationId xmlns:a16="http://schemas.microsoft.com/office/drawing/2014/main" id="{C03A5E36-2FF9-4BF3-1D5B-FD9411CD87A2}"/>
+              </a:ext>
+            </a:extLst>
+          </p:cNvPr>
+          <p:cNvSpPr txBox="1"/>
+          <p:nvPr/>
+        </p:nvSpPr>
+        <p:spPr>
+          <a:xfrm>
+            <a:off x="7691120" y="3105834"/>
+            <a:ext cx="3108960" cy="646331"/>
+          </a:xfrm>
+          <a:prstGeom prst="rect">
+            <a:avLst/>
+          </a:prstGeom>
+          <a:noFill/>
+        </p:spPr>
+        <p:txBody>
+          <a:bodyPr wrap="square" rtlCol="0">
+            <a:spAutoFit/>
+          </a:bodyPr>
+          <a:lstStyle/>
+          <a:p>
+            <a:r>
+              <a:rPr lang="fr-FR" dirty="0"/>
+              <a:t>Et je </a:t>
+            </a:r>
+            <a:r>
+              <a:rPr lang="fr-FR" dirty="0" err="1"/>
+              <a:t>redige</a:t>
+            </a:r>
+            <a:r>
+              <a:rPr lang="fr-FR" dirty="0"/>
+              <a:t> mon fichier de configuration </a:t>
+            </a:r>
+            <a:r>
+              <a:rPr lang="fr-FR" dirty="0" err="1"/>
+              <a:t>nginx</a:t>
+            </a:r>
+            <a:endParaRPr lang="fr-FR" dirty="0"/>
+          </a:p>
+        </p:txBody>
+      </p:sp>
+    </p:spTree>
+    <p:extLst>
+      <p:ext uri="{BB962C8B-B14F-4D97-AF65-F5344CB8AC3E}">
+        <p14:creationId xmlns:p14="http://schemas.microsoft.com/office/powerpoint/2010/main" val="1067761894"/>
+      </p:ext>
+    </p:extLst>
+  </p:cSld>
+  <p:clrMapOvr>
+    <a:masterClrMapping/>
+  </p:clrMapOvr>
+</p:sld>
+</file>
+
 <file path=ppt/slides/slide2.xml><?xml version="1.0" encoding="utf-8"?>
 <p:sld xmlns:a="http://schemas.openxmlformats.org/drawingml/2006/main" xmlns:r="http://schemas.openxmlformats.org/officeDocument/2006/relationships" xmlns:p="http://schemas.openxmlformats.org/presentationml/2006/main">
   <p:cSld>
@@ -3481,6 +5280,326 @@
     <p:extLst>
       <p:ext uri="{BB962C8B-B14F-4D97-AF65-F5344CB8AC3E}">
         <p14:creationId xmlns:p14="http://schemas.microsoft.com/office/powerpoint/2010/main" val="900058436"/>
+      </p:ext>
+    </p:extLst>
+  </p:cSld>
+  <p:clrMapOvr>
+    <a:masterClrMapping/>
+  </p:clrMapOvr>
+</p:sld>
+</file>
+
+<file path=ppt/slides/slide20.xml><?xml version="1.0" encoding="utf-8"?>
+<p:sld xmlns:a="http://schemas.openxmlformats.org/drawingml/2006/main" xmlns:r="http://schemas.openxmlformats.org/officeDocument/2006/relationships" xmlns:p="http://schemas.openxmlformats.org/presentationml/2006/main">
+  <p:cSld>
+    <p:spTree>
+      <p:nvGrpSpPr>
+        <p:cNvPr id="1" name=""/>
+        <p:cNvGrpSpPr/>
+        <p:nvPr/>
+      </p:nvGrpSpPr>
+      <p:grpSpPr>
+        <a:xfrm>
+          <a:off x="0" y="0"/>
+          <a:ext cx="0" cy="0"/>
+          <a:chOff x="0" y="0"/>
+          <a:chExt cx="0" cy="0"/>
+        </a:xfrm>
+      </p:grpSpPr>
+      <p:sp>
+        <p:nvSpPr>
+          <p:cNvPr id="2" name="Titre 1">
+            <a:extLst>
+              <a:ext uri="{FF2B5EF4-FFF2-40B4-BE49-F238E27FC236}">
+                <a16:creationId xmlns:a16="http://schemas.microsoft.com/office/drawing/2014/main" id="{793951C1-8411-7579-3837-CF76B6A42826}"/>
+              </a:ext>
+            </a:extLst>
+          </p:cNvPr>
+          <p:cNvSpPr>
+            <a:spLocks noGrp="1"/>
+          </p:cNvSpPr>
+          <p:nvPr>
+            <p:ph type="title"/>
+          </p:nvPr>
+        </p:nvSpPr>
+        <p:spPr/>
+        <p:txBody>
+          <a:bodyPr/>
+          <a:lstStyle/>
+          <a:p>
+            <a:r>
+              <a:rPr lang="fr-FR" dirty="0"/>
+              <a:t>DEPLOIMENT DES DIFFERENTES PLATFORME</a:t>
+            </a:r>
+          </a:p>
+        </p:txBody>
+      </p:sp>
+      <p:sp>
+        <p:nvSpPr>
+          <p:cNvPr id="3" name="Espace réservé du contenu 2">
+            <a:extLst>
+              <a:ext uri="{FF2B5EF4-FFF2-40B4-BE49-F238E27FC236}">
+                <a16:creationId xmlns:a16="http://schemas.microsoft.com/office/drawing/2014/main" id="{47B591A6-736E-0CC9-3905-2635D5E61E42}"/>
+              </a:ext>
+            </a:extLst>
+          </p:cNvPr>
+          <p:cNvSpPr>
+            <a:spLocks noGrp="1"/>
+          </p:cNvSpPr>
+          <p:nvPr>
+            <p:ph idx="1"/>
+          </p:nvPr>
+        </p:nvSpPr>
+        <p:spPr/>
+        <p:txBody>
+          <a:bodyPr/>
+          <a:lstStyle/>
+          <a:p>
+            <a:pPr marL="0" indent="0">
+              <a:buNone/>
+            </a:pPr>
+            <a:r>
+              <a:rPr lang="fr-FR" dirty="0"/>
+              <a:t>Je teste le serveur avec </a:t>
+            </a:r>
+            <a:r>
+              <a:rPr lang="fr-FR" dirty="0">
+                <a:solidFill>
+                  <a:schemeClr val="accent2"/>
+                </a:solidFill>
+              </a:rPr>
+              <a:t> </a:t>
+            </a:r>
+            <a:r>
+              <a:rPr lang="fr-FR" dirty="0" err="1">
+                <a:solidFill>
+                  <a:schemeClr val="accent2"/>
+                </a:solidFill>
+              </a:rPr>
+              <a:t>sudo</a:t>
+            </a:r>
+            <a:r>
+              <a:rPr lang="fr-FR" dirty="0">
+                <a:solidFill>
+                  <a:schemeClr val="accent2"/>
+                </a:solidFill>
+              </a:rPr>
+              <a:t> </a:t>
+            </a:r>
+            <a:r>
+              <a:rPr lang="fr-FR" dirty="0" err="1">
+                <a:solidFill>
+                  <a:schemeClr val="accent2"/>
+                </a:solidFill>
+              </a:rPr>
+              <a:t>nginx</a:t>
+            </a:r>
+            <a:r>
+              <a:rPr lang="fr-FR" dirty="0">
+                <a:solidFill>
+                  <a:schemeClr val="accent2"/>
+                </a:solidFill>
+              </a:rPr>
+              <a:t> –t </a:t>
+            </a:r>
+            <a:endParaRPr lang="fr-FR" dirty="0"/>
+          </a:p>
+          <a:p>
+            <a:pPr marL="0" indent="0">
+              <a:buNone/>
+            </a:pPr>
+            <a:endParaRPr lang="fr-FR" dirty="0">
+              <a:solidFill>
+                <a:schemeClr val="accent2"/>
+              </a:solidFill>
+            </a:endParaRPr>
+          </a:p>
+          <a:p>
+            <a:pPr marL="0" indent="0">
+              <a:buNone/>
+            </a:pPr>
+            <a:r>
+              <a:rPr lang="fr-FR" dirty="0"/>
+              <a:t>Et je le relance avec </a:t>
+            </a:r>
+            <a:r>
+              <a:rPr lang="fr-FR" dirty="0" err="1">
+                <a:solidFill>
+                  <a:schemeClr val="accent2"/>
+                </a:solidFill>
+              </a:rPr>
+              <a:t>sudo</a:t>
+            </a:r>
+            <a:r>
+              <a:rPr lang="fr-FR" dirty="0">
+                <a:solidFill>
+                  <a:schemeClr val="accent2"/>
+                </a:solidFill>
+              </a:rPr>
+              <a:t> </a:t>
+            </a:r>
+            <a:r>
+              <a:rPr lang="fr-FR" dirty="0" err="1">
+                <a:solidFill>
+                  <a:schemeClr val="accent2"/>
+                </a:solidFill>
+              </a:rPr>
+              <a:t>systemctl</a:t>
+            </a:r>
+            <a:r>
+              <a:rPr lang="fr-FR" dirty="0">
+                <a:solidFill>
+                  <a:schemeClr val="accent2"/>
+                </a:solidFill>
+              </a:rPr>
+              <a:t> </a:t>
+            </a:r>
+            <a:r>
+              <a:rPr lang="fr-FR" dirty="0" err="1">
+                <a:solidFill>
+                  <a:schemeClr val="accent2"/>
+                </a:solidFill>
+              </a:rPr>
+              <a:t>reload</a:t>
+            </a:r>
+            <a:r>
+              <a:rPr lang="fr-FR" dirty="0">
+                <a:solidFill>
+                  <a:schemeClr val="accent2"/>
+                </a:solidFill>
+              </a:rPr>
+              <a:t> </a:t>
+            </a:r>
+            <a:r>
+              <a:rPr lang="fr-FR" dirty="0" err="1">
+                <a:solidFill>
+                  <a:schemeClr val="accent2"/>
+                </a:solidFill>
+              </a:rPr>
+              <a:t>nginx</a:t>
+            </a:r>
+            <a:r>
+              <a:rPr lang="fr-FR" dirty="0">
+                <a:solidFill>
+                  <a:schemeClr val="accent2"/>
+                </a:solidFill>
+              </a:rPr>
+              <a:t> </a:t>
+            </a:r>
+            <a:br>
+              <a:rPr lang="fr-FR" dirty="0">
+                <a:solidFill>
+                  <a:schemeClr val="accent2"/>
+                </a:solidFill>
+              </a:rPr>
+            </a:br>
+            <a:br>
+              <a:rPr lang="fr-FR" dirty="0">
+                <a:solidFill>
+                  <a:schemeClr val="accent2"/>
+                </a:solidFill>
+              </a:rPr>
+            </a:br>
+            <a:endParaRPr lang="fr-FR" dirty="0">
+              <a:solidFill>
+                <a:schemeClr val="accent2"/>
+              </a:solidFill>
+            </a:endParaRPr>
+          </a:p>
+        </p:txBody>
+      </p:sp>
+    </p:spTree>
+    <p:extLst>
+      <p:ext uri="{BB962C8B-B14F-4D97-AF65-F5344CB8AC3E}">
+        <p14:creationId xmlns:p14="http://schemas.microsoft.com/office/powerpoint/2010/main" val="294618835"/>
+      </p:ext>
+    </p:extLst>
+  </p:cSld>
+  <p:clrMapOvr>
+    <a:masterClrMapping/>
+  </p:clrMapOvr>
+</p:sld>
+</file>
+
+<file path=ppt/slides/slide21.xml><?xml version="1.0" encoding="utf-8"?>
+<p:sld xmlns:a="http://schemas.openxmlformats.org/drawingml/2006/main" xmlns:r="http://schemas.openxmlformats.org/officeDocument/2006/relationships" xmlns:p="http://schemas.openxmlformats.org/presentationml/2006/main">
+  <p:cSld>
+    <p:spTree>
+      <p:nvGrpSpPr>
+        <p:cNvPr id="1" name=""/>
+        <p:cNvGrpSpPr/>
+        <p:nvPr/>
+      </p:nvGrpSpPr>
+      <p:grpSpPr>
+        <a:xfrm>
+          <a:off x="0" y="0"/>
+          <a:ext cx="0" cy="0"/>
+          <a:chOff x="0" y="0"/>
+          <a:chExt cx="0" cy="0"/>
+        </a:xfrm>
+      </p:grpSpPr>
+      <p:sp>
+        <p:nvSpPr>
+          <p:cNvPr id="3" name="Espace réservé du contenu 2">
+            <a:extLst>
+              <a:ext uri="{FF2B5EF4-FFF2-40B4-BE49-F238E27FC236}">
+                <a16:creationId xmlns:a16="http://schemas.microsoft.com/office/drawing/2014/main" id="{20256A99-A963-E240-1F8B-C3EA371CE5E4}"/>
+              </a:ext>
+            </a:extLst>
+          </p:cNvPr>
+          <p:cNvSpPr>
+            <a:spLocks noGrp="1"/>
+          </p:cNvSpPr>
+          <p:nvPr>
+            <p:ph idx="1"/>
+          </p:nvPr>
+        </p:nvSpPr>
+        <p:spPr>
+          <a:xfrm>
+            <a:off x="838200" y="1253331"/>
+            <a:ext cx="10515600" cy="4351338"/>
+          </a:xfrm>
+        </p:spPr>
+        <p:txBody>
+          <a:bodyPr/>
+          <a:lstStyle/>
+          <a:p>
+            <a:pPr marL="0" indent="0" algn="ctr">
+              <a:buNone/>
+            </a:pPr>
+            <a:r>
+              <a:rPr lang="fr-FR" dirty="0"/>
+              <a:t>Pour le visiter </a:t>
+            </a:r>
+          </a:p>
+          <a:p>
+            <a:pPr marL="0" indent="0" algn="ctr">
+              <a:buNone/>
+            </a:pPr>
+            <a:r>
+              <a:rPr lang="fr-FR" dirty="0"/>
+              <a:t>Rendez vous sur </a:t>
+            </a:r>
+            <a:br>
+              <a:rPr lang="fr-FR" dirty="0"/>
+            </a:br>
+            <a:br>
+              <a:rPr lang="fr-FR" dirty="0"/>
+            </a:br>
+            <a:r>
+              <a:rPr lang="fr-FR" dirty="0">
+                <a:hlinkClick r:id="rId2"/>
+              </a:rPr>
+              <a:t>http://104.155.43.118</a:t>
+            </a:r>
+            <a:endParaRPr lang="fr-FR" dirty="0"/>
+          </a:p>
+        </p:txBody>
+      </p:sp>
+    </p:spTree>
+    <p:extLst>
+      <p:ext uri="{BB962C8B-B14F-4D97-AF65-F5344CB8AC3E}">
+        <p14:creationId xmlns:p14="http://schemas.microsoft.com/office/powerpoint/2010/main" val="2507874826"/>
       </p:ext>
     </p:extLst>
   </p:cSld>
@@ -4418,7 +6537,7 @@
         </p:nvSpPr>
         <p:spPr>
           <a:xfrm>
-            <a:off x="8199120" y="1778000"/>
+            <a:off x="6918960" y="3048000"/>
             <a:ext cx="3154680" cy="1200329"/>
           </a:xfrm>
           <a:prstGeom prst="rect">
@@ -4434,41 +6553,8 @@
           <a:p>
             <a:r>
               <a:rPr lang="fr-FR" dirty="0"/>
-              <a:t>Entité comprenant la structure d’un produit  en base de données pour être ensuite renvoyer au </a:t>
-            </a:r>
-            <a:r>
-              <a:rPr lang="fr-FR" dirty="0" err="1"/>
-              <a:t>consomateur</a:t>
-            </a:r>
-            <a:r>
-              <a:rPr lang="fr-FR" dirty="0"/>
-              <a:t>.</a:t>
-            </a:r>
-          </a:p>
-        </p:txBody>
-      </p:sp>
-      <p:sp>
-        <p:nvSpPr>
-          <p:cNvPr id="12" name="Espace réservé du contenu 11">
-            <a:extLst>
-              <a:ext uri="{FF2B5EF4-FFF2-40B4-BE49-F238E27FC236}">
-                <a16:creationId xmlns:a16="http://schemas.microsoft.com/office/drawing/2014/main" id="{029633EE-7972-4DD1-AF41-45340BCD2C0E}"/>
-              </a:ext>
-            </a:extLst>
-          </p:cNvPr>
-          <p:cNvSpPr>
-            <a:spLocks noGrp="1"/>
-          </p:cNvSpPr>
-          <p:nvPr>
-            <p:ph idx="1"/>
-          </p:nvPr>
-        </p:nvSpPr>
-        <p:spPr/>
-        <p:txBody>
-          <a:bodyPr/>
-          <a:lstStyle/>
-          <a:p>
-            <a:endParaRPr lang="fr-FR" dirty="0"/>
+              <a:t>Entité comprenant la structure d’un produit  en base de données pour être ensuite renvoyer au consommateur.</a:t>
+            </a:r>
           </a:p>
         </p:txBody>
       </p:sp>

</xml_diff>